<commit_message>
tidy basis expansion diagram.
</commit_message>
<xml_diff>
--- a/outputs/basis-expansion-diagram/2023-01-02-basis-expansion-diagram.pptx
+++ b/outputs/basis-expansion-diagram/2023-01-02-basis-expansion-diagram.pptx
@@ -3487,7 +3487,7 @@
         <p:spPr>
           <a:xfrm>
             <a:off x="0" y="3684242"/>
-            <a:ext cx="2540000" cy="1169551"/>
+            <a:ext cx="2270328" cy="1169551"/>
           </a:xfrm>
           <a:prstGeom prst="rect">
             <a:avLst/>
@@ -3501,10 +3501,10 @@
           <a:lstStyle/>
           <a:p>
             <a:r>
-              <a:rPr lang="en-GB" sz="1400" b="1" i="1" dirty="0">
-                <a:latin typeface="CMU Serif BoldItalic" panose="02000603000000000000" pitchFamily="2" charset="0"/>
-                <a:ea typeface="CMU Serif BoldItalic" panose="02000603000000000000" pitchFamily="2" charset="0"/>
-                <a:cs typeface="CMU Serif BoldItalic" panose="02000603000000000000" pitchFamily="2" charset="0"/>
+              <a:rPr lang="en-GB" sz="1400" b="1" dirty="0">
+                <a:latin typeface="CMU Serif" panose="02000603000000000000" pitchFamily="2" charset="0"/>
+                <a:ea typeface="CMU Serif" panose="02000603000000000000" pitchFamily="2" charset="0"/>
+                <a:cs typeface="CMU Serif" panose="02000603000000000000" pitchFamily="2" charset="0"/>
               </a:rPr>
               <a:t>Time normalisation </a:t>
             </a:r>

</xml_diff>